<commit_message>
Backup file DataSource prima di editarlo
</commit_message>
<xml_diff>
--- a/Solution/PptGeneratorGUI/SourceFiles/PowerPoint_Template.pptx
+++ b/Solution/PptGeneratorGUI/SourceFiles/PowerPoint_Template.pptx
@@ -241,7 +241,7 @@
             <a:fld id="{73BD9947-774B-094C-86BB-7C1BB671F378}" type="datetime1">
               <a:rPr lang="it-IT"/>
               <a:pPr/>
-              <a:t>01/10/2025</a:t>
+              <a:t>14/10/2025</a:t>
             </a:fld>
             <a:endParaRPr lang="it-IT"/>
           </a:p>
@@ -409,7 +409,7 @@
             <a:fld id="{686F962A-24C2-CB42-9306-9FB7F7CEB1DA}" type="datetime1">
               <a:rPr lang="it-IT"/>
               <a:pPr/>
-              <a:t>01/10/2025</a:t>
+              <a:t>14/10/2025</a:t>
             </a:fld>
             <a:endParaRPr lang="it-IT"/>
           </a:p>
@@ -773,7 +773,7 @@
             <a:fld id="{8214DEE6-7743-F44A-92DF-ABEA6EBF579C}" type="datetime1">
               <a:rPr lang="it-IT"/>
               <a:pPr/>
-              <a:t>01/10/2025</a:t>
+              <a:t>14/10/2025</a:t>
             </a:fld>
             <a:endParaRPr lang="it-IT"/>
           </a:p>
@@ -1449,7 +1449,7 @@
             <a:fld id="{B9C6BC69-A223-7D4A-AE22-15BEED04061C}" type="datetime1">
               <a:rPr lang="it-IT"/>
               <a:pPr/>
-              <a:t>01/10/2025</a:t>
+              <a:t>14/10/2025</a:t>
             </a:fld>
             <a:endParaRPr lang="it-IT"/>
           </a:p>
@@ -2041,7 +2041,7 @@
             <a:fld id="{B9C6BC69-A223-7D4A-AE22-15BEED04061C}" type="datetime1">
               <a:rPr lang="it-IT"/>
               <a:pPr/>
-              <a:t>01/10/2025</a:t>
+              <a:t>14/10/2025</a:t>
             </a:fld>
             <a:endParaRPr lang="it-IT"/>
           </a:p>
@@ -2801,7 +2801,7 @@
             <a:fld id="{B9C6BC69-A223-7D4A-AE22-15BEED04061C}" type="datetime1">
               <a:rPr lang="it-IT"/>
               <a:pPr/>
-              <a:t>01/10/2025</a:t>
+              <a:t>14/10/2025</a:t>
             </a:fld>
             <a:endParaRPr lang="it-IT"/>
           </a:p>
@@ -4088,7 +4088,7 @@
             <a:fld id="{B9C6BC69-A223-7D4A-AE22-15BEED04061C}" type="datetime1">
               <a:rPr lang="it-IT"/>
               <a:pPr/>
-              <a:t>01/10/2025</a:t>
+              <a:t>14/10/2025</a:t>
             </a:fld>
             <a:endParaRPr lang="it-IT"/>
           </a:p>
@@ -4541,7 +4541,7 @@
             <a:fld id="{B9C6BC69-A223-7D4A-AE22-15BEED04061C}" type="datetime1">
               <a:rPr lang="it-IT"/>
               <a:pPr/>
-              <a:t>01/10/2025</a:t>
+              <a:t>14/10/2025</a:t>
             </a:fld>
             <a:endParaRPr lang="it-IT"/>
           </a:p>
@@ -4736,7 +4736,7 @@
             <a:fld id="{B9C6BC69-A223-7D4A-AE22-15BEED04061C}" type="datetime1">
               <a:rPr lang="it-IT"/>
               <a:pPr/>
-              <a:t>01/10/2025</a:t>
+              <a:t>14/10/2025</a:t>
             </a:fld>
             <a:endParaRPr lang="it-IT"/>
           </a:p>
@@ -4797,7 +4797,7 @@
           <a:graphicData uri="http://schemas.openxmlformats.org/presentationml/2006/ole">
             <mc:AlternateContent xmlns:mc="http://schemas.openxmlformats.org/markup-compatibility/2006">
               <mc:Choice xmlns:v="urn:schemas-microsoft-com:vml" Requires="v">
-                <p:oleObj spid="_x0000_s5131" name="Diapositiva think-cell" r:id="rId4" imgW="270" imgH="270" progId="TCLayout.ActiveDocument.1">
+                <p:oleObj spid="_x0000_s5132" name="Diapositiva think-cell" r:id="rId4" imgW="270" imgH="270" progId="TCLayout.ActiveDocument.1">
                   <p:embed/>
                 </p:oleObj>
               </mc:Choice>
@@ -4914,7 +4914,7 @@
             <a:fld id="{B9C6BC69-A223-7D4A-AE22-15BEED04061C}" type="datetime1">
               <a:rPr lang="it-IT" smtClean="0"/>
               <a:pPr/>
-              <a:t>01/10/2025</a:t>
+              <a:t>14/10/2025</a:t>
             </a:fld>
             <a:endParaRPr lang="it-IT" dirty="0"/>
           </a:p>
@@ -7262,7 +7262,7 @@
             <a:fld id="{B9C6BC69-A223-7D4A-AE22-15BEED04061C}" type="datetime1">
               <a:rPr lang="it-IT"/>
               <a:pPr/>
-              <a:t>01/10/2025</a:t>
+              <a:t>14/10/2025</a:t>
             </a:fld>
             <a:endParaRPr lang="it-IT"/>
           </a:p>
@@ -7323,7 +7323,7 @@
           <a:graphicData uri="http://schemas.openxmlformats.org/presentationml/2006/ole">
             <mc:AlternateContent xmlns:mc="http://schemas.openxmlformats.org/markup-compatibility/2006">
               <mc:Choice xmlns:v="urn:schemas-microsoft-com:vml" Requires="v">
-                <p:oleObj spid="_x0000_s4107" name="Diapositiva think-cell" r:id="rId4" imgW="270" imgH="270" progId="TCLayout.ActiveDocument.1">
+                <p:oleObj spid="_x0000_s4108" name="Diapositiva think-cell" r:id="rId4" imgW="270" imgH="270" progId="TCLayout.ActiveDocument.1">
                   <p:embed/>
                 </p:oleObj>
               </mc:Choice>
@@ -7631,7 +7631,7 @@
             <a:fld id="{B9C6BC69-A223-7D4A-AE22-15BEED04061C}" type="datetime1">
               <a:rPr lang="it-IT"/>
               <a:pPr/>
-              <a:t>01/10/2025</a:t>
+              <a:t>14/10/2025</a:t>
             </a:fld>
             <a:endParaRPr lang="it-IT"/>
           </a:p>
@@ -8093,7 +8093,7 @@
             <a:fld id="{B9C6BC69-A223-7D4A-AE22-15BEED04061C}" type="datetime1">
               <a:rPr lang="it-IT"/>
               <a:pPr/>
-              <a:t>01/10/2025</a:t>
+              <a:t>14/10/2025</a:t>
             </a:fld>
             <a:endParaRPr lang="it-IT"/>
           </a:p>
@@ -8471,7 +8471,7 @@
             <a:fld id="{B9C6BC69-A223-7D4A-AE22-15BEED04061C}" type="datetime1">
               <a:rPr lang="it-IT"/>
               <a:pPr/>
-              <a:t>01/10/2025</a:t>
+              <a:t>14/10/2025</a:t>
             </a:fld>
             <a:endParaRPr lang="it-IT"/>
           </a:p>
@@ -8790,7 +8790,7 @@
             <a:fld id="{B9C6BC69-A223-7D4A-AE22-15BEED04061C}" type="datetime1">
               <a:rPr lang="it-IT"/>
               <a:pPr/>
-              <a:t>01/10/2025</a:t>
+              <a:t>14/10/2025</a:t>
             </a:fld>
             <a:endParaRPr lang="it-IT"/>
           </a:p>
@@ -8836,7 +8836,7 @@
           <p:cNvPr id="2" name="Oggetto 1" hidden="1">
             <a:extLst>
               <a:ext uri="{FF2B5EF4-FFF2-40B4-BE49-F238E27FC236}">
-                <a16:creationId xmlns:a16="http://schemas.microsoft.com/office/drawing/2014/main" xmlns="" id="{806360A6-C612-49A8-98A1-B1A844B18FE4}"/>
+                <a16:creationId xmlns="" xmlns:a16="http://schemas.microsoft.com/office/drawing/2014/main" id="{806360A6-C612-49A8-98A1-B1A844B18FE4}"/>
               </a:ext>
             </a:extLst>
           </p:cNvPr>
@@ -8862,7 +8862,7 @@
           <a:graphicData uri="http://schemas.openxmlformats.org/presentationml/2006/ole">
             <mc:AlternateContent xmlns:mc="http://schemas.openxmlformats.org/markup-compatibility/2006">
               <mc:Choice xmlns:v="urn:schemas-microsoft-com:vml" Requires="v">
-                <p:oleObj spid="_x0000_s1035" name="Diapositiva think-cell" r:id="rId5" imgW="270" imgH="270" progId="TCLayout.ActiveDocument.1">
+                <p:oleObj spid="_x0000_s1036" name="Diapositiva think-cell" r:id="rId5" imgW="270" imgH="270" progId="TCLayout.ActiveDocument.1">
                   <p:embed/>
                 </p:oleObj>
               </mc:Choice>
@@ -9273,7 +9273,7 @@
           <p:cNvPr id="5" name="Oggetto 4" hidden="1">
             <a:extLst>
               <a:ext uri="{FF2B5EF4-FFF2-40B4-BE49-F238E27FC236}">
-                <a16:creationId xmlns:a16="http://schemas.microsoft.com/office/drawing/2014/main" xmlns="" id="{9322E714-FBEE-4145-8597-9978C4C42D40}"/>
+                <a16:creationId xmlns="" xmlns:a16="http://schemas.microsoft.com/office/drawing/2014/main" id="{9322E714-FBEE-4145-8597-9978C4C42D40}"/>
               </a:ext>
             </a:extLst>
           </p:cNvPr>
@@ -9299,7 +9299,7 @@
           <a:graphicData uri="http://schemas.openxmlformats.org/presentationml/2006/ole">
             <mc:AlternateContent xmlns:mc="http://schemas.openxmlformats.org/markup-compatibility/2006">
               <mc:Choice xmlns:v="urn:schemas-microsoft-com:vml" Requires="v">
-                <p:oleObj spid="_x0000_s12299" name="Diapositiva think-cell" r:id="rId6" imgW="270" imgH="270" progId="TCLayout.ActiveDocument.1">
+                <p:oleObj spid="_x0000_s12300" name="Diapositiva think-cell" r:id="rId6" imgW="270" imgH="270" progId="TCLayout.ActiveDocument.1">
                   <p:embed/>
                 </p:oleObj>
               </mc:Choice>
@@ -9339,7 +9339,7 @@
           <p:cNvPr id="4" name="Rettangolo 3" hidden="1">
             <a:extLst>
               <a:ext uri="{FF2B5EF4-FFF2-40B4-BE49-F238E27FC236}">
-                <a16:creationId xmlns:a16="http://schemas.microsoft.com/office/drawing/2014/main" xmlns="" id="{62FA0B85-488D-4AE4-862F-D64B51F1802A}"/>
+                <a16:creationId xmlns="" xmlns:a16="http://schemas.microsoft.com/office/drawing/2014/main" id="{62FA0B85-488D-4AE4-862F-D64B51F1802A}"/>
               </a:ext>
             </a:extLst>
           </p:cNvPr>
@@ -9861,7 +9861,7 @@
           <p:cNvPr id="2" name="Oggetto 1" hidden="1">
             <a:extLst>
               <a:ext uri="{FF2B5EF4-FFF2-40B4-BE49-F238E27FC236}">
-                <a16:creationId xmlns:a16="http://schemas.microsoft.com/office/drawing/2014/main" xmlns="" id="{4D1C2F66-66AE-480C-88C5-6432EFBA8B5C}"/>
+                <a16:creationId xmlns="" xmlns:a16="http://schemas.microsoft.com/office/drawing/2014/main" id="{4D1C2F66-66AE-480C-88C5-6432EFBA8B5C}"/>
               </a:ext>
             </a:extLst>
           </p:cNvPr>
@@ -9887,7 +9887,7 @@
           <a:graphicData uri="http://schemas.openxmlformats.org/presentationml/2006/ole">
             <mc:AlternateContent xmlns:mc="http://schemas.openxmlformats.org/markup-compatibility/2006">
               <mc:Choice xmlns:v="urn:schemas-microsoft-com:vml" Requires="v">
-                <p:oleObj spid="_x0000_s2059" name="Diapositiva think-cell" r:id="rId7" imgW="270" imgH="270" progId="TCLayout.ActiveDocument.1">
+                <p:oleObj spid="_x0000_s2060" name="Diapositiva think-cell" r:id="rId7" imgW="270" imgH="270" progId="TCLayout.ActiveDocument.1">
                   <p:embed/>
                 </p:oleObj>
               </mc:Choice>
@@ -10299,7 +10299,7 @@
           <a:graphicData uri="http://schemas.openxmlformats.org/presentationml/2006/ole">
             <mc:AlternateContent xmlns:mc="http://schemas.openxmlformats.org/markup-compatibility/2006">
               <mc:Choice xmlns:v="urn:schemas-microsoft-com:vml" Requires="v">
-                <p:oleObj spid="_x0000_s3083" name="Diapositiva think-cell" r:id="rId16" imgW="270" imgH="270" progId="TCLayout.ActiveDocument.1">
+                <p:oleObj spid="_x0000_s3084" name="Diapositiva think-cell" r:id="rId16" imgW="270" imgH="270" progId="TCLayout.ActiveDocument.1">
                   <p:embed/>
                 </p:oleObj>
               </mc:Choice>
@@ -10783,7 +10783,7 @@
           <p:cNvPr id="4" name="Oggetto 3" hidden="1">
             <a:extLst>
               <a:ext uri="{FF2B5EF4-FFF2-40B4-BE49-F238E27FC236}">
-                <a16:creationId xmlns:a16="http://schemas.microsoft.com/office/drawing/2014/main" xmlns="" id="{7B0C7B7E-F192-4DDB-A370-11C614CB6C01}"/>
+                <a16:creationId xmlns="" xmlns:a16="http://schemas.microsoft.com/office/drawing/2014/main" id="{7B0C7B7E-F192-4DDB-A370-11C614CB6C01}"/>
               </a:ext>
             </a:extLst>
           </p:cNvPr>
@@ -10809,7 +10809,7 @@
           <a:graphicData uri="http://schemas.openxmlformats.org/presentationml/2006/ole">
             <mc:AlternateContent xmlns:mc="http://schemas.openxmlformats.org/markup-compatibility/2006">
               <mc:Choice xmlns:v="urn:schemas-microsoft-com:vml" Requires="v">
-                <p:oleObj spid="_x0000_s6155" name="Diapositiva think-cell" r:id="rId6" imgW="270" imgH="270" progId="TCLayout.ActiveDocument.1">
+                <p:oleObj spid="_x0000_s6156" name="Diapositiva think-cell" r:id="rId6" imgW="270" imgH="270" progId="TCLayout.ActiveDocument.1">
                   <p:embed/>
                 </p:oleObj>
               </mc:Choice>
@@ -10849,7 +10849,7 @@
           <p:cNvPr id="3" name="Rettangolo 2" hidden="1">
             <a:extLst>
               <a:ext uri="{FF2B5EF4-FFF2-40B4-BE49-F238E27FC236}">
-                <a16:creationId xmlns:a16="http://schemas.microsoft.com/office/drawing/2014/main" xmlns="" id="{59BA6DC0-A791-4D09-8A83-9C21E33E28AA}"/>
+                <a16:creationId xmlns="" xmlns:a16="http://schemas.microsoft.com/office/drawing/2014/main" id="{59BA6DC0-A791-4D09-8A83-9C21E33E28AA}"/>
               </a:ext>
             </a:extLst>
           </p:cNvPr>
@@ -11558,7 +11558,7 @@
           <p:cNvPr id="5" name="Oggetto 4" hidden="1">
             <a:extLst>
               <a:ext uri="{FF2B5EF4-FFF2-40B4-BE49-F238E27FC236}">
-                <a16:creationId xmlns:a16="http://schemas.microsoft.com/office/drawing/2014/main" xmlns="" id="{1757F136-FA5A-4D88-80E6-1F8CE6FF3418}"/>
+                <a16:creationId xmlns="" xmlns:a16="http://schemas.microsoft.com/office/drawing/2014/main" id="{1757F136-FA5A-4D88-80E6-1F8CE6FF3418}"/>
               </a:ext>
             </a:extLst>
           </p:cNvPr>
@@ -11584,7 +11584,7 @@
           <a:graphicData uri="http://schemas.openxmlformats.org/presentationml/2006/ole">
             <mc:AlternateContent xmlns:mc="http://schemas.openxmlformats.org/markup-compatibility/2006">
               <mc:Choice xmlns:v="urn:schemas-microsoft-com:vml" Requires="v">
-                <p:oleObj spid="_x0000_s7179" name="Diapositiva think-cell" r:id="rId6" imgW="270" imgH="270" progId="TCLayout.ActiveDocument.1">
+                <p:oleObj spid="_x0000_s7180" name="Diapositiva think-cell" r:id="rId6" imgW="270" imgH="270" progId="TCLayout.ActiveDocument.1">
                   <p:embed/>
                 </p:oleObj>
               </mc:Choice>
@@ -11624,7 +11624,7 @@
           <p:cNvPr id="4" name="Rettangolo 3" hidden="1">
             <a:extLst>
               <a:ext uri="{FF2B5EF4-FFF2-40B4-BE49-F238E27FC236}">
-                <a16:creationId xmlns:a16="http://schemas.microsoft.com/office/drawing/2014/main" xmlns="" id="{A85F65EE-61EA-4DBF-83E0-BF0ADD626DC3}"/>
+                <a16:creationId xmlns="" xmlns:a16="http://schemas.microsoft.com/office/drawing/2014/main" id="{A85F65EE-61EA-4DBF-83E0-BF0ADD626DC3}"/>
               </a:ext>
             </a:extLst>
           </p:cNvPr>
@@ -12429,7 +12429,7 @@
           <p:cNvPr id="4" name="Oggetto 3" hidden="1">
             <a:extLst>
               <a:ext uri="{FF2B5EF4-FFF2-40B4-BE49-F238E27FC236}">
-                <a16:creationId xmlns:a16="http://schemas.microsoft.com/office/drawing/2014/main" xmlns="" id="{77CBD9E6-2CE6-43C7-9999-674C4D1288AA}"/>
+                <a16:creationId xmlns="" xmlns:a16="http://schemas.microsoft.com/office/drawing/2014/main" id="{77CBD9E6-2CE6-43C7-9999-674C4D1288AA}"/>
               </a:ext>
             </a:extLst>
           </p:cNvPr>
@@ -12455,7 +12455,7 @@
           <a:graphicData uri="http://schemas.openxmlformats.org/presentationml/2006/ole">
             <mc:AlternateContent xmlns:mc="http://schemas.openxmlformats.org/markup-compatibility/2006">
               <mc:Choice xmlns:v="urn:schemas-microsoft-com:vml" Requires="v">
-                <p:oleObj spid="_x0000_s8203" name="Diapositiva think-cell" r:id="rId6" imgW="270" imgH="270" progId="TCLayout.ActiveDocument.1">
+                <p:oleObj spid="_x0000_s8204" name="Diapositiva think-cell" r:id="rId6" imgW="270" imgH="270" progId="TCLayout.ActiveDocument.1">
                   <p:embed/>
                 </p:oleObj>
               </mc:Choice>
@@ -12495,7 +12495,7 @@
           <p:cNvPr id="3" name="Rettangolo 2" hidden="1">
             <a:extLst>
               <a:ext uri="{FF2B5EF4-FFF2-40B4-BE49-F238E27FC236}">
-                <a16:creationId xmlns:a16="http://schemas.microsoft.com/office/drawing/2014/main" xmlns="" id="{A6980AB4-ECF4-48D4-88C2-C06EAD44374D}"/>
+                <a16:creationId xmlns="" xmlns:a16="http://schemas.microsoft.com/office/drawing/2014/main" id="{A6980AB4-ECF4-48D4-88C2-C06EAD44374D}"/>
               </a:ext>
             </a:extLst>
           </p:cNvPr>
@@ -13274,7 +13274,7 @@
           <a:graphicData uri="http://schemas.openxmlformats.org/presentationml/2006/ole">
             <mc:AlternateContent xmlns:mc="http://schemas.openxmlformats.org/markup-compatibility/2006">
               <mc:Choice xmlns:v="urn:schemas-microsoft-com:vml" Requires="v">
-                <p:oleObj spid="_x0000_s9227" name="Diapositiva think-cell" r:id="rId5" imgW="216" imgH="216" progId="TCLayout.ActiveDocument.1">
+                <p:oleObj spid="_x0000_s9228" name="Diapositiva think-cell" r:id="rId5" imgW="216" imgH="216" progId="TCLayout.ActiveDocument.1">
                   <p:embed/>
                 </p:oleObj>
               </mc:Choice>
@@ -13314,7 +13314,7 @@
           <p:cNvPr id="4" name="Rettangolo 3" hidden="1">
             <a:extLst>
               <a:ext uri="{FF2B5EF4-FFF2-40B4-BE49-F238E27FC236}">
-                <a16:creationId xmlns:a16="http://schemas.microsoft.com/office/drawing/2014/main" xmlns="" id="{B8E84D0A-0DF2-4492-953F-C944F7C598A7}"/>
+                <a16:creationId xmlns="" xmlns:a16="http://schemas.microsoft.com/office/drawing/2014/main" id="{B8E84D0A-0DF2-4492-953F-C944F7C598A7}"/>
               </a:ext>
             </a:extLst>
           </p:cNvPr>
@@ -13896,7 +13896,7 @@
           <p:cNvPr id="4" name="Oggetto 3" hidden="1">
             <a:extLst>
               <a:ext uri="{FF2B5EF4-FFF2-40B4-BE49-F238E27FC236}">
-                <a16:creationId xmlns:a16="http://schemas.microsoft.com/office/drawing/2014/main" xmlns="" id="{08B70646-CBD9-44F3-A0E6-415A68C25240}"/>
+                <a16:creationId xmlns="" xmlns:a16="http://schemas.microsoft.com/office/drawing/2014/main" id="{08B70646-CBD9-44F3-A0E6-415A68C25240}"/>
               </a:ext>
             </a:extLst>
           </p:cNvPr>
@@ -13922,7 +13922,7 @@
           <a:graphicData uri="http://schemas.openxmlformats.org/presentationml/2006/ole">
             <mc:AlternateContent xmlns:mc="http://schemas.openxmlformats.org/markup-compatibility/2006">
               <mc:Choice xmlns:v="urn:schemas-microsoft-com:vml" Requires="v">
-                <p:oleObj spid="_x0000_s10251" name="Diapositiva think-cell" r:id="rId6" imgW="270" imgH="270" progId="TCLayout.ActiveDocument.1">
+                <p:oleObj spid="_x0000_s10252" name="Diapositiva think-cell" r:id="rId6" imgW="270" imgH="270" progId="TCLayout.ActiveDocument.1">
                   <p:embed/>
                 </p:oleObj>
               </mc:Choice>
@@ -13962,7 +13962,7 @@
           <p:cNvPr id="3" name="Rettangolo 2" hidden="1">
             <a:extLst>
               <a:ext uri="{FF2B5EF4-FFF2-40B4-BE49-F238E27FC236}">
-                <a16:creationId xmlns:a16="http://schemas.microsoft.com/office/drawing/2014/main" xmlns="" id="{EF1716FB-0984-41E0-ABE5-1412DA28DF33}"/>
+                <a16:creationId xmlns="" xmlns:a16="http://schemas.microsoft.com/office/drawing/2014/main" id="{EF1716FB-0984-41E0-ABE5-1412DA28DF33}"/>
               </a:ext>
             </a:extLst>
           </p:cNvPr>
@@ -14713,7 +14713,7 @@
           <a:graphicData uri="http://schemas.openxmlformats.org/presentationml/2006/ole">
             <mc:AlternateContent xmlns:mc="http://schemas.openxmlformats.org/markup-compatibility/2006">
               <mc:Choice xmlns:v="urn:schemas-microsoft-com:vml" Requires="v">
-                <p:oleObj spid="_x0000_s11275" name="Diapositiva think-cell" r:id="rId5" imgW="216" imgH="216" progId="TCLayout.ActiveDocument.1">
+                <p:oleObj spid="_x0000_s11276" name="Diapositiva think-cell" r:id="rId5" imgW="216" imgH="216" progId="TCLayout.ActiveDocument.1">
                   <p:embed/>
                 </p:oleObj>
               </mc:Choice>
@@ -14753,7 +14753,7 @@
           <p:cNvPr id="5" name="Rettangolo 4" hidden="1">
             <a:extLst>
               <a:ext uri="{FF2B5EF4-FFF2-40B4-BE49-F238E27FC236}">
-                <a16:creationId xmlns:a16="http://schemas.microsoft.com/office/drawing/2014/main" xmlns="" id="{70F06448-8C35-431F-878F-42CCA4A1FB39}"/>
+                <a16:creationId xmlns="" xmlns:a16="http://schemas.microsoft.com/office/drawing/2014/main" id="{70F06448-8C35-431F-878F-42CCA4A1FB39}"/>
               </a:ext>
             </a:extLst>
           </p:cNvPr>
@@ -15341,7 +15341,7 @@
             <a:fld id="{8214DEE6-7743-F44A-92DF-ABEA6EBF579C}" type="datetime1">
               <a:rPr lang="it-IT" smtClean="0"/>
               <a:pPr/>
-              <a:t>01/10/2025</a:t>
+              <a:t>14/10/2025</a:t>
             </a:fld>
             <a:endParaRPr lang="it-IT"/>
           </a:p>
@@ -15428,7 +15428,7 @@
           <a:graphicData uri="http://schemas.openxmlformats.org/presentationml/2006/ole">
             <mc:AlternateContent xmlns:mc="http://schemas.openxmlformats.org/markup-compatibility/2006">
               <mc:Choice xmlns:v="urn:schemas-microsoft-com:vml" Requires="v">
-                <p:oleObj spid="_x0000_s14347" name="Diapositiva think-cell" r:id="rId4" imgW="270" imgH="270" progId="TCLayout.ActiveDocument.1">
+                <p:oleObj spid="_x0000_s14348" name="Diapositiva think-cell" r:id="rId4" imgW="270" imgH="270" progId="TCLayout.ActiveDocument.1">
                   <p:embed/>
                 </p:oleObj>
               </mc:Choice>
@@ -15468,7 +15468,7 @@
           <p:cNvPr id="6" name="Picture 5">
             <a:extLst>
               <a:ext uri="{FF2B5EF4-FFF2-40B4-BE49-F238E27FC236}">
-                <a16:creationId xmlns:a16="http://schemas.microsoft.com/office/drawing/2014/main" xmlns="" id="{53D91E67-CAFC-D7D6-F019-7AD3237D1098}"/>
+                <a16:creationId xmlns="" xmlns:a16="http://schemas.microsoft.com/office/drawing/2014/main" id="{53D91E67-CAFC-D7D6-F019-7AD3237D1098}"/>
               </a:ext>
             </a:extLst>
           </p:cNvPr>
@@ -15504,7 +15504,7 @@
     <a:masterClrMapping/>
   </p:clrMapOvr>
   <mc:AlternateContent xmlns:mc="http://schemas.openxmlformats.org/markup-compatibility/2006">
-    <mc:Choice xmlns:p159="http://schemas.microsoft.com/office/powerpoint/2015/09/main" xmlns="" Requires="p159">
+    <mc:Choice xmlns="" xmlns:p159="http://schemas.microsoft.com/office/powerpoint/2015/09/main" Requires="p159">
       <p:transition>
         <p159:morph option="byObject"/>
       </p:transition>
@@ -15587,6 +15587,13 @@
           <a:prstGeom prst="rect">
             <a:avLst/>
           </a:prstGeom>
+          <a:ln>
+            <a:solidFill>
+              <a:schemeClr val="tx1">
+                <a:lumMod val="50000"/>
+              </a:schemeClr>
+            </a:solidFill>
+          </a:ln>
         </p:spPr>
         <p:style>
           <a:lnRef idx="1">
@@ -15607,7 +15614,11 @@
           <a:lstStyle/>
           <a:p>
             <a:pPr algn="ctr"/>
-            <a:endParaRPr lang="en-GB"/>
+            <a:endParaRPr lang="en-GB">
+              <a:solidFill>
+                <a:srgbClr val="FFFFFF"/>
+              </a:solidFill>
+            </a:endParaRPr>
           </a:p>
         </p:txBody>
       </p:sp>

</xml_diff>

<commit_message>
Migliorato filtro in UI
</commit_message>
<xml_diff>
--- a/Solution/PptGeneratorGUI/SourceFiles/PowerPoint_Template.pptx
+++ b/Solution/PptGeneratorGUI/SourceFiles/PowerPoint_Template.pptx
@@ -241,7 +241,7 @@
             <a:fld id="{73BD9947-774B-094C-86BB-7C1BB671F378}" type="datetime1">
               <a:rPr lang="it-IT"/>
               <a:pPr/>
-              <a:t>19/10/2025</a:t>
+              <a:t>20/10/2025</a:t>
             </a:fld>
             <a:endParaRPr lang="it-IT"/>
           </a:p>
@@ -409,7 +409,7 @@
             <a:fld id="{686F962A-24C2-CB42-9306-9FB7F7CEB1DA}" type="datetime1">
               <a:rPr lang="it-IT"/>
               <a:pPr/>
-              <a:t>19/10/2025</a:t>
+              <a:t>20/10/2025</a:t>
             </a:fld>
             <a:endParaRPr lang="it-IT"/>
           </a:p>
@@ -773,7 +773,7 @@
             <a:fld id="{8214DEE6-7743-F44A-92DF-ABEA6EBF579C}" type="datetime1">
               <a:rPr lang="it-IT"/>
               <a:pPr/>
-              <a:t>19/10/2025</a:t>
+              <a:t>20/10/2025</a:t>
             </a:fld>
             <a:endParaRPr lang="it-IT"/>
           </a:p>
@@ -1449,7 +1449,7 @@
             <a:fld id="{B9C6BC69-A223-7D4A-AE22-15BEED04061C}" type="datetime1">
               <a:rPr lang="it-IT"/>
               <a:pPr/>
-              <a:t>19/10/2025</a:t>
+              <a:t>20/10/2025</a:t>
             </a:fld>
             <a:endParaRPr lang="it-IT"/>
           </a:p>
@@ -2041,7 +2041,7 @@
             <a:fld id="{B9C6BC69-A223-7D4A-AE22-15BEED04061C}" type="datetime1">
               <a:rPr lang="it-IT"/>
               <a:pPr/>
-              <a:t>19/10/2025</a:t>
+              <a:t>20/10/2025</a:t>
             </a:fld>
             <a:endParaRPr lang="it-IT"/>
           </a:p>
@@ -2801,7 +2801,7 @@
             <a:fld id="{B9C6BC69-A223-7D4A-AE22-15BEED04061C}" type="datetime1">
               <a:rPr lang="it-IT"/>
               <a:pPr/>
-              <a:t>19/10/2025</a:t>
+              <a:t>20/10/2025</a:t>
             </a:fld>
             <a:endParaRPr lang="it-IT"/>
           </a:p>
@@ -4088,7 +4088,7 @@
             <a:fld id="{B9C6BC69-A223-7D4A-AE22-15BEED04061C}" type="datetime1">
               <a:rPr lang="it-IT"/>
               <a:pPr/>
-              <a:t>19/10/2025</a:t>
+              <a:t>20/10/2025</a:t>
             </a:fld>
             <a:endParaRPr lang="it-IT"/>
           </a:p>
@@ -4541,7 +4541,7 @@
             <a:fld id="{B9C6BC69-A223-7D4A-AE22-15BEED04061C}" type="datetime1">
               <a:rPr lang="it-IT"/>
               <a:pPr/>
-              <a:t>19/10/2025</a:t>
+              <a:t>20/10/2025</a:t>
             </a:fld>
             <a:endParaRPr lang="it-IT"/>
           </a:p>
@@ -4736,7 +4736,7 @@
             <a:fld id="{B9C6BC69-A223-7D4A-AE22-15BEED04061C}" type="datetime1">
               <a:rPr lang="it-IT"/>
               <a:pPr/>
-              <a:t>19/10/2025</a:t>
+              <a:t>20/10/2025</a:t>
             </a:fld>
             <a:endParaRPr lang="it-IT"/>
           </a:p>
@@ -4797,7 +4797,7 @@
           <a:graphicData uri="http://schemas.openxmlformats.org/presentationml/2006/ole">
             <mc:AlternateContent xmlns:mc="http://schemas.openxmlformats.org/markup-compatibility/2006">
               <mc:Choice xmlns:v="urn:schemas-microsoft-com:vml" Requires="v">
-                <p:oleObj spid="_x0000_s5139" name="Diapositiva think-cell" r:id="rId4" imgW="270" imgH="270" progId="TCLayout.ActiveDocument.1">
+                <p:oleObj spid="_x0000_s5140" name="Diapositiva think-cell" r:id="rId4" imgW="270" imgH="270" progId="TCLayout.ActiveDocument.1">
                   <p:embed/>
                 </p:oleObj>
               </mc:Choice>
@@ -4914,7 +4914,7 @@
             <a:fld id="{B9C6BC69-A223-7D4A-AE22-15BEED04061C}" type="datetime1">
               <a:rPr lang="it-IT" smtClean="0"/>
               <a:pPr/>
-              <a:t>19/10/2025</a:t>
+              <a:t>20/10/2025</a:t>
             </a:fld>
             <a:endParaRPr lang="it-IT" dirty="0"/>
           </a:p>
@@ -7262,7 +7262,7 @@
             <a:fld id="{B9C6BC69-A223-7D4A-AE22-15BEED04061C}" type="datetime1">
               <a:rPr lang="it-IT"/>
               <a:pPr/>
-              <a:t>19/10/2025</a:t>
+              <a:t>20/10/2025</a:t>
             </a:fld>
             <a:endParaRPr lang="it-IT"/>
           </a:p>
@@ -7323,7 +7323,7 @@
           <a:graphicData uri="http://schemas.openxmlformats.org/presentationml/2006/ole">
             <mc:AlternateContent xmlns:mc="http://schemas.openxmlformats.org/markup-compatibility/2006">
               <mc:Choice xmlns:v="urn:schemas-microsoft-com:vml" Requires="v">
-                <p:oleObj spid="_x0000_s4115" name="Diapositiva think-cell" r:id="rId4" imgW="270" imgH="270" progId="TCLayout.ActiveDocument.1">
+                <p:oleObj spid="_x0000_s4116" name="Diapositiva think-cell" r:id="rId4" imgW="270" imgH="270" progId="TCLayout.ActiveDocument.1">
                   <p:embed/>
                 </p:oleObj>
               </mc:Choice>
@@ -7631,7 +7631,7 @@
             <a:fld id="{B9C6BC69-A223-7D4A-AE22-15BEED04061C}" type="datetime1">
               <a:rPr lang="it-IT"/>
               <a:pPr/>
-              <a:t>19/10/2025</a:t>
+              <a:t>20/10/2025</a:t>
             </a:fld>
             <a:endParaRPr lang="it-IT"/>
           </a:p>
@@ -8093,7 +8093,7 @@
             <a:fld id="{B9C6BC69-A223-7D4A-AE22-15BEED04061C}" type="datetime1">
               <a:rPr lang="it-IT"/>
               <a:pPr/>
-              <a:t>19/10/2025</a:t>
+              <a:t>20/10/2025</a:t>
             </a:fld>
             <a:endParaRPr lang="it-IT"/>
           </a:p>
@@ -8471,7 +8471,7 @@
             <a:fld id="{B9C6BC69-A223-7D4A-AE22-15BEED04061C}" type="datetime1">
               <a:rPr lang="it-IT"/>
               <a:pPr/>
-              <a:t>19/10/2025</a:t>
+              <a:t>20/10/2025</a:t>
             </a:fld>
             <a:endParaRPr lang="it-IT"/>
           </a:p>
@@ -8790,7 +8790,7 @@
             <a:fld id="{B9C6BC69-A223-7D4A-AE22-15BEED04061C}" type="datetime1">
               <a:rPr lang="it-IT"/>
               <a:pPr/>
-              <a:t>19/10/2025</a:t>
+              <a:t>20/10/2025</a:t>
             </a:fld>
             <a:endParaRPr lang="it-IT"/>
           </a:p>
@@ -8836,7 +8836,7 @@
           <p:cNvPr id="2" name="Oggetto 1" hidden="1">
             <a:extLst>
               <a:ext uri="{FF2B5EF4-FFF2-40B4-BE49-F238E27FC236}">
-                <a16:creationId xmlns:a16="http://schemas.microsoft.com/office/drawing/2014/main" xmlns="" id="{806360A6-C612-49A8-98A1-B1A844B18FE4}"/>
+                <a16:creationId xmlns="" xmlns:a16="http://schemas.microsoft.com/office/drawing/2014/main" id="{806360A6-C612-49A8-98A1-B1A844B18FE4}"/>
               </a:ext>
             </a:extLst>
           </p:cNvPr>
@@ -8862,7 +8862,7 @@
           <a:graphicData uri="http://schemas.openxmlformats.org/presentationml/2006/ole">
             <mc:AlternateContent xmlns:mc="http://schemas.openxmlformats.org/markup-compatibility/2006">
               <mc:Choice xmlns:v="urn:schemas-microsoft-com:vml" Requires="v">
-                <p:oleObj spid="_x0000_s1043" name="Diapositiva think-cell" r:id="rId5" imgW="270" imgH="270" progId="TCLayout.ActiveDocument.1">
+                <p:oleObj spid="_x0000_s1044" name="Diapositiva think-cell" r:id="rId5" imgW="270" imgH="270" progId="TCLayout.ActiveDocument.1">
                   <p:embed/>
                 </p:oleObj>
               </mc:Choice>
@@ -9273,7 +9273,7 @@
           <p:cNvPr id="5" name="Oggetto 4" hidden="1">
             <a:extLst>
               <a:ext uri="{FF2B5EF4-FFF2-40B4-BE49-F238E27FC236}">
-                <a16:creationId xmlns:a16="http://schemas.microsoft.com/office/drawing/2014/main" xmlns="" id="{9322E714-FBEE-4145-8597-9978C4C42D40}"/>
+                <a16:creationId xmlns="" xmlns:a16="http://schemas.microsoft.com/office/drawing/2014/main" id="{9322E714-FBEE-4145-8597-9978C4C42D40}"/>
               </a:ext>
             </a:extLst>
           </p:cNvPr>
@@ -9299,7 +9299,7 @@
           <a:graphicData uri="http://schemas.openxmlformats.org/presentationml/2006/ole">
             <mc:AlternateContent xmlns:mc="http://schemas.openxmlformats.org/markup-compatibility/2006">
               <mc:Choice xmlns:v="urn:schemas-microsoft-com:vml" Requires="v">
-                <p:oleObj spid="_x0000_s12307" name="Diapositiva think-cell" r:id="rId6" imgW="270" imgH="270" progId="TCLayout.ActiveDocument.1">
+                <p:oleObj spid="_x0000_s12308" name="Diapositiva think-cell" r:id="rId6" imgW="270" imgH="270" progId="TCLayout.ActiveDocument.1">
                   <p:embed/>
                 </p:oleObj>
               </mc:Choice>
@@ -9339,7 +9339,7 @@
           <p:cNvPr id="4" name="Rettangolo 3" hidden="1">
             <a:extLst>
               <a:ext uri="{FF2B5EF4-FFF2-40B4-BE49-F238E27FC236}">
-                <a16:creationId xmlns:a16="http://schemas.microsoft.com/office/drawing/2014/main" xmlns="" id="{62FA0B85-488D-4AE4-862F-D64B51F1802A}"/>
+                <a16:creationId xmlns="" xmlns:a16="http://schemas.microsoft.com/office/drawing/2014/main" id="{62FA0B85-488D-4AE4-862F-D64B51F1802A}"/>
               </a:ext>
             </a:extLst>
           </p:cNvPr>
@@ -9861,7 +9861,7 @@
           <p:cNvPr id="2" name="Oggetto 1" hidden="1">
             <a:extLst>
               <a:ext uri="{FF2B5EF4-FFF2-40B4-BE49-F238E27FC236}">
-                <a16:creationId xmlns:a16="http://schemas.microsoft.com/office/drawing/2014/main" xmlns="" id="{4D1C2F66-66AE-480C-88C5-6432EFBA8B5C}"/>
+                <a16:creationId xmlns="" xmlns:a16="http://schemas.microsoft.com/office/drawing/2014/main" id="{4D1C2F66-66AE-480C-88C5-6432EFBA8B5C}"/>
               </a:ext>
             </a:extLst>
           </p:cNvPr>
@@ -9887,7 +9887,7 @@
           <a:graphicData uri="http://schemas.openxmlformats.org/presentationml/2006/ole">
             <mc:AlternateContent xmlns:mc="http://schemas.openxmlformats.org/markup-compatibility/2006">
               <mc:Choice xmlns:v="urn:schemas-microsoft-com:vml" Requires="v">
-                <p:oleObj spid="_x0000_s2067" name="Diapositiva think-cell" r:id="rId7" imgW="270" imgH="270" progId="TCLayout.ActiveDocument.1">
+                <p:oleObj spid="_x0000_s2068" name="Diapositiva think-cell" r:id="rId7" imgW="270" imgH="270" progId="TCLayout.ActiveDocument.1">
                   <p:embed/>
                 </p:oleObj>
               </mc:Choice>
@@ -10299,7 +10299,7 @@
           <a:graphicData uri="http://schemas.openxmlformats.org/presentationml/2006/ole">
             <mc:AlternateContent xmlns:mc="http://schemas.openxmlformats.org/markup-compatibility/2006">
               <mc:Choice xmlns:v="urn:schemas-microsoft-com:vml" Requires="v">
-                <p:oleObj spid="_x0000_s3091" name="Diapositiva think-cell" r:id="rId16" imgW="270" imgH="270" progId="TCLayout.ActiveDocument.1">
+                <p:oleObj spid="_x0000_s3092" name="Diapositiva think-cell" r:id="rId16" imgW="270" imgH="270" progId="TCLayout.ActiveDocument.1">
                   <p:embed/>
                 </p:oleObj>
               </mc:Choice>
@@ -10783,7 +10783,7 @@
           <p:cNvPr id="4" name="Oggetto 3" hidden="1">
             <a:extLst>
               <a:ext uri="{FF2B5EF4-FFF2-40B4-BE49-F238E27FC236}">
-                <a16:creationId xmlns:a16="http://schemas.microsoft.com/office/drawing/2014/main" xmlns="" id="{7B0C7B7E-F192-4DDB-A370-11C614CB6C01}"/>
+                <a16:creationId xmlns="" xmlns:a16="http://schemas.microsoft.com/office/drawing/2014/main" id="{7B0C7B7E-F192-4DDB-A370-11C614CB6C01}"/>
               </a:ext>
             </a:extLst>
           </p:cNvPr>
@@ -10809,7 +10809,7 @@
           <a:graphicData uri="http://schemas.openxmlformats.org/presentationml/2006/ole">
             <mc:AlternateContent xmlns:mc="http://schemas.openxmlformats.org/markup-compatibility/2006">
               <mc:Choice xmlns:v="urn:schemas-microsoft-com:vml" Requires="v">
-                <p:oleObj spid="_x0000_s6163" name="Diapositiva think-cell" r:id="rId6" imgW="270" imgH="270" progId="TCLayout.ActiveDocument.1">
+                <p:oleObj spid="_x0000_s6164" name="Diapositiva think-cell" r:id="rId6" imgW="270" imgH="270" progId="TCLayout.ActiveDocument.1">
                   <p:embed/>
                 </p:oleObj>
               </mc:Choice>
@@ -10849,7 +10849,7 @@
           <p:cNvPr id="3" name="Rettangolo 2" hidden="1">
             <a:extLst>
               <a:ext uri="{FF2B5EF4-FFF2-40B4-BE49-F238E27FC236}">
-                <a16:creationId xmlns:a16="http://schemas.microsoft.com/office/drawing/2014/main" xmlns="" id="{59BA6DC0-A791-4D09-8A83-9C21E33E28AA}"/>
+                <a16:creationId xmlns="" xmlns:a16="http://schemas.microsoft.com/office/drawing/2014/main" id="{59BA6DC0-A791-4D09-8A83-9C21E33E28AA}"/>
               </a:ext>
             </a:extLst>
           </p:cNvPr>
@@ -11558,7 +11558,7 @@
           <p:cNvPr id="5" name="Oggetto 4" hidden="1">
             <a:extLst>
               <a:ext uri="{FF2B5EF4-FFF2-40B4-BE49-F238E27FC236}">
-                <a16:creationId xmlns:a16="http://schemas.microsoft.com/office/drawing/2014/main" xmlns="" id="{1757F136-FA5A-4D88-80E6-1F8CE6FF3418}"/>
+                <a16:creationId xmlns="" xmlns:a16="http://schemas.microsoft.com/office/drawing/2014/main" id="{1757F136-FA5A-4D88-80E6-1F8CE6FF3418}"/>
               </a:ext>
             </a:extLst>
           </p:cNvPr>
@@ -11584,7 +11584,7 @@
           <a:graphicData uri="http://schemas.openxmlformats.org/presentationml/2006/ole">
             <mc:AlternateContent xmlns:mc="http://schemas.openxmlformats.org/markup-compatibility/2006">
               <mc:Choice xmlns:v="urn:schemas-microsoft-com:vml" Requires="v">
-                <p:oleObj spid="_x0000_s7187" name="Diapositiva think-cell" r:id="rId6" imgW="270" imgH="270" progId="TCLayout.ActiveDocument.1">
+                <p:oleObj spid="_x0000_s7188" name="Diapositiva think-cell" r:id="rId6" imgW="270" imgH="270" progId="TCLayout.ActiveDocument.1">
                   <p:embed/>
                 </p:oleObj>
               </mc:Choice>
@@ -11624,7 +11624,7 @@
           <p:cNvPr id="4" name="Rettangolo 3" hidden="1">
             <a:extLst>
               <a:ext uri="{FF2B5EF4-FFF2-40B4-BE49-F238E27FC236}">
-                <a16:creationId xmlns:a16="http://schemas.microsoft.com/office/drawing/2014/main" xmlns="" id="{A85F65EE-61EA-4DBF-83E0-BF0ADD626DC3}"/>
+                <a16:creationId xmlns="" xmlns:a16="http://schemas.microsoft.com/office/drawing/2014/main" id="{A85F65EE-61EA-4DBF-83E0-BF0ADD626DC3}"/>
               </a:ext>
             </a:extLst>
           </p:cNvPr>
@@ -12429,7 +12429,7 @@
           <p:cNvPr id="4" name="Oggetto 3" hidden="1">
             <a:extLst>
               <a:ext uri="{FF2B5EF4-FFF2-40B4-BE49-F238E27FC236}">
-                <a16:creationId xmlns:a16="http://schemas.microsoft.com/office/drawing/2014/main" xmlns="" id="{77CBD9E6-2CE6-43C7-9999-674C4D1288AA}"/>
+                <a16:creationId xmlns="" xmlns:a16="http://schemas.microsoft.com/office/drawing/2014/main" id="{77CBD9E6-2CE6-43C7-9999-674C4D1288AA}"/>
               </a:ext>
             </a:extLst>
           </p:cNvPr>
@@ -12455,7 +12455,7 @@
           <a:graphicData uri="http://schemas.openxmlformats.org/presentationml/2006/ole">
             <mc:AlternateContent xmlns:mc="http://schemas.openxmlformats.org/markup-compatibility/2006">
               <mc:Choice xmlns:v="urn:schemas-microsoft-com:vml" Requires="v">
-                <p:oleObj spid="_x0000_s8211" name="Diapositiva think-cell" r:id="rId6" imgW="270" imgH="270" progId="TCLayout.ActiveDocument.1">
+                <p:oleObj spid="_x0000_s8212" name="Diapositiva think-cell" r:id="rId6" imgW="270" imgH="270" progId="TCLayout.ActiveDocument.1">
                   <p:embed/>
                 </p:oleObj>
               </mc:Choice>
@@ -12495,7 +12495,7 @@
           <p:cNvPr id="3" name="Rettangolo 2" hidden="1">
             <a:extLst>
               <a:ext uri="{FF2B5EF4-FFF2-40B4-BE49-F238E27FC236}">
-                <a16:creationId xmlns:a16="http://schemas.microsoft.com/office/drawing/2014/main" xmlns="" id="{A6980AB4-ECF4-48D4-88C2-C06EAD44374D}"/>
+                <a16:creationId xmlns="" xmlns:a16="http://schemas.microsoft.com/office/drawing/2014/main" id="{A6980AB4-ECF4-48D4-88C2-C06EAD44374D}"/>
               </a:ext>
             </a:extLst>
           </p:cNvPr>
@@ -13274,7 +13274,7 @@
           <a:graphicData uri="http://schemas.openxmlformats.org/presentationml/2006/ole">
             <mc:AlternateContent xmlns:mc="http://schemas.openxmlformats.org/markup-compatibility/2006">
               <mc:Choice xmlns:v="urn:schemas-microsoft-com:vml" Requires="v">
-                <p:oleObj spid="_x0000_s9235" name="Diapositiva think-cell" r:id="rId5" imgW="216" imgH="216" progId="TCLayout.ActiveDocument.1">
+                <p:oleObj spid="_x0000_s9236" name="Diapositiva think-cell" r:id="rId5" imgW="216" imgH="216" progId="TCLayout.ActiveDocument.1">
                   <p:embed/>
                 </p:oleObj>
               </mc:Choice>
@@ -13314,7 +13314,7 @@
           <p:cNvPr id="4" name="Rettangolo 3" hidden="1">
             <a:extLst>
               <a:ext uri="{FF2B5EF4-FFF2-40B4-BE49-F238E27FC236}">
-                <a16:creationId xmlns:a16="http://schemas.microsoft.com/office/drawing/2014/main" xmlns="" id="{B8E84D0A-0DF2-4492-953F-C944F7C598A7}"/>
+                <a16:creationId xmlns="" xmlns:a16="http://schemas.microsoft.com/office/drawing/2014/main" id="{B8E84D0A-0DF2-4492-953F-C944F7C598A7}"/>
               </a:ext>
             </a:extLst>
           </p:cNvPr>
@@ -13896,7 +13896,7 @@
           <p:cNvPr id="4" name="Oggetto 3" hidden="1">
             <a:extLst>
               <a:ext uri="{FF2B5EF4-FFF2-40B4-BE49-F238E27FC236}">
-                <a16:creationId xmlns:a16="http://schemas.microsoft.com/office/drawing/2014/main" xmlns="" id="{08B70646-CBD9-44F3-A0E6-415A68C25240}"/>
+                <a16:creationId xmlns="" xmlns:a16="http://schemas.microsoft.com/office/drawing/2014/main" id="{08B70646-CBD9-44F3-A0E6-415A68C25240}"/>
               </a:ext>
             </a:extLst>
           </p:cNvPr>
@@ -13922,7 +13922,7 @@
           <a:graphicData uri="http://schemas.openxmlformats.org/presentationml/2006/ole">
             <mc:AlternateContent xmlns:mc="http://schemas.openxmlformats.org/markup-compatibility/2006">
               <mc:Choice xmlns:v="urn:schemas-microsoft-com:vml" Requires="v">
-                <p:oleObj spid="_x0000_s10259" name="Diapositiva think-cell" r:id="rId6" imgW="270" imgH="270" progId="TCLayout.ActiveDocument.1">
+                <p:oleObj spid="_x0000_s10260" name="Diapositiva think-cell" r:id="rId6" imgW="270" imgH="270" progId="TCLayout.ActiveDocument.1">
                   <p:embed/>
                 </p:oleObj>
               </mc:Choice>
@@ -13962,7 +13962,7 @@
           <p:cNvPr id="3" name="Rettangolo 2" hidden="1">
             <a:extLst>
               <a:ext uri="{FF2B5EF4-FFF2-40B4-BE49-F238E27FC236}">
-                <a16:creationId xmlns:a16="http://schemas.microsoft.com/office/drawing/2014/main" xmlns="" id="{EF1716FB-0984-41E0-ABE5-1412DA28DF33}"/>
+                <a16:creationId xmlns="" xmlns:a16="http://schemas.microsoft.com/office/drawing/2014/main" id="{EF1716FB-0984-41E0-ABE5-1412DA28DF33}"/>
               </a:ext>
             </a:extLst>
           </p:cNvPr>
@@ -14713,7 +14713,7 @@
           <a:graphicData uri="http://schemas.openxmlformats.org/presentationml/2006/ole">
             <mc:AlternateContent xmlns:mc="http://schemas.openxmlformats.org/markup-compatibility/2006">
               <mc:Choice xmlns:v="urn:schemas-microsoft-com:vml" Requires="v">
-                <p:oleObj spid="_x0000_s11283" name="Diapositiva think-cell" r:id="rId5" imgW="216" imgH="216" progId="TCLayout.ActiveDocument.1">
+                <p:oleObj spid="_x0000_s11284" name="Diapositiva think-cell" r:id="rId5" imgW="216" imgH="216" progId="TCLayout.ActiveDocument.1">
                   <p:embed/>
                 </p:oleObj>
               </mc:Choice>
@@ -14753,7 +14753,7 @@
           <p:cNvPr id="5" name="Rettangolo 4" hidden="1">
             <a:extLst>
               <a:ext uri="{FF2B5EF4-FFF2-40B4-BE49-F238E27FC236}">
-                <a16:creationId xmlns:a16="http://schemas.microsoft.com/office/drawing/2014/main" xmlns="" id="{70F06448-8C35-431F-878F-42CCA4A1FB39}"/>
+                <a16:creationId xmlns="" xmlns:a16="http://schemas.microsoft.com/office/drawing/2014/main" id="{70F06448-8C35-431F-878F-42CCA4A1FB39}"/>
               </a:ext>
             </a:extLst>
           </p:cNvPr>
@@ -15341,7 +15341,7 @@
             <a:fld id="{8214DEE6-7743-F44A-92DF-ABEA6EBF579C}" type="datetime1">
               <a:rPr lang="it-IT" smtClean="0"/>
               <a:pPr/>
-              <a:t>19/10/2025</a:t>
+              <a:t>20/10/2025</a:t>
             </a:fld>
             <a:endParaRPr lang="it-IT"/>
           </a:p>
@@ -15537,55 +15537,6 @@
             <a:endParaRPr lang="en-GB" sz="2200" b="1" dirty="0">
               <a:solidFill>
                 <a:schemeClr val="bg1"/>
-              </a:solidFill>
-            </a:endParaRPr>
-          </a:p>
-        </p:txBody>
-      </p:sp>
-      <p:sp>
-        <p:nvSpPr>
-          <p:cNvPr id="4" name="Rectangle 3"/>
-          <p:cNvSpPr/>
-          <p:nvPr/>
-        </p:nvSpPr>
-        <p:spPr>
-          <a:xfrm>
-            <a:off x="379040" y="932220"/>
-            <a:ext cx="9864000" cy="4536000"/>
-          </a:xfrm>
-          <a:prstGeom prst="rect">
-            <a:avLst/>
-          </a:prstGeom>
-          <a:ln>
-            <a:solidFill>
-              <a:schemeClr val="tx1">
-                <a:lumMod val="50000"/>
-              </a:schemeClr>
-            </a:solidFill>
-          </a:ln>
-        </p:spPr>
-        <p:style>
-          <a:lnRef idx="1">
-            <a:schemeClr val="accent1"/>
-          </a:lnRef>
-          <a:fillRef idx="3">
-            <a:schemeClr val="accent1"/>
-          </a:fillRef>
-          <a:effectRef idx="2">
-            <a:schemeClr val="accent1"/>
-          </a:effectRef>
-          <a:fontRef idx="minor">
-            <a:schemeClr val="lt1"/>
-          </a:fontRef>
-        </p:style>
-        <p:txBody>
-          <a:bodyPr rtlCol="0" anchor="ctr"/>
-          <a:lstStyle/>
-          <a:p>
-            <a:pPr algn="ctr"/>
-            <a:endParaRPr lang="en-GB">
-              <a:solidFill>
-                <a:srgbClr val="FFFFFF"/>
               </a:solidFill>
             </a:endParaRPr>
           </a:p>

</xml_diff>